<commit_message>
Added 1992-2013 rainfall data from Cape Nature
</commit_message>
<xml_diff>
--- a/img/veldwatch.pptx
+++ b/img/veldwatch.pptx
@@ -3103,8 +3103,8 @@
         </p:nvSpPr>
         <p:spPr>
           <a:xfrm>
-            <a:off x="234683" y="1808550"/>
-            <a:ext cx="7716922" cy="3202931"/>
+            <a:off x="234683" y="1090653"/>
+            <a:ext cx="7716922" cy="4762979"/>
           </a:xfrm>
           <a:prstGeom prst="rect">
             <a:avLst/>

</xml_diff>